<commit_message>
slight modification to problem slides
</commit_message>
<xml_diff>
--- a/slides/instruction/problems.pptx
+++ b/slides/instruction/problems.pptx
@@ -6,16 +6,17 @@
     <p:sldMasterId id="2147483688" r:id="rId2"/>
   </p:sldMasterIdLst>
   <p:notesMasterIdLst>
-    <p:notesMasterId r:id="rId7"/>
+    <p:notesMasterId r:id="rId8"/>
   </p:notesMasterIdLst>
   <p:handoutMasterIdLst>
-    <p:handoutMasterId r:id="rId8"/>
+    <p:handoutMasterId r:id="rId9"/>
   </p:handoutMasterIdLst>
   <p:sldIdLst>
     <p:sldId id="1409" r:id="rId3"/>
-    <p:sldId id="1408" r:id="rId4"/>
-    <p:sldId id="1407" r:id="rId5"/>
-    <p:sldId id="872" r:id="rId6"/>
+    <p:sldId id="1410" r:id="rId4"/>
+    <p:sldId id="1408" r:id="rId5"/>
+    <p:sldId id="1407" r:id="rId6"/>
+    <p:sldId id="872" r:id="rId7"/>
   </p:sldIdLst>
   <p:sldSz cx="12192000" cy="6858000"/>
   <p:notesSz cx="7010400" cy="9296400"/>
@@ -150,6 +151,7 @@
         <p14:section name="默认节" id="{1384C60E-CF6F-41E4-9A0E-04B589348A65}">
           <p14:sldIdLst>
             <p14:sldId id="1409"/>
+            <p14:sldId id="1410"/>
             <p14:sldId id="1408"/>
             <p14:sldId id="1407"/>
             <p14:sldId id="872"/>
@@ -1163,7 +1165,7 @@
             <a:fld id="{8DA2099C-E03D-4BEA-80BD-EC59252D8E32}" type="slidenum">
               <a:rPr lang="zh-CN" altLang="en-US" smtClean="0"/>
               <a:pPr/>
-              <a:t>2</a:t>
+              <a:t>3</a:t>
             </a:fld>
             <a:endParaRPr lang="en-US" altLang="zh-CN"/>
           </a:p>
@@ -1248,7 +1250,7 @@
             <a:fld id="{8DA2099C-E03D-4BEA-80BD-EC59252D8E32}" type="slidenum">
               <a:rPr lang="zh-CN" altLang="en-US" smtClean="0"/>
               <a:pPr/>
-              <a:t>3</a:t>
+              <a:t>4</a:t>
             </a:fld>
             <a:endParaRPr lang="en-US" altLang="zh-CN"/>
           </a:p>
@@ -1333,7 +1335,7 @@
             <a:fld id="{8DA2099C-E03D-4BEA-80BD-EC59252D8E32}" type="slidenum">
               <a:rPr lang="zh-CN" altLang="en-US" smtClean="0"/>
               <a:pPr/>
-              <a:t>4</a:t>
+              <a:t>5</a:t>
             </a:fld>
             <a:endParaRPr lang="en-US" altLang="zh-CN"/>
           </a:p>
@@ -8437,6 +8439,228 @@
       </p:grpSpPr>
       <p:sp>
         <p:nvSpPr>
+          <p:cNvPr id="3" name="内容占位符 2">
+            <a:extLst>
+              <a:ext uri="{FF2B5EF4-FFF2-40B4-BE49-F238E27FC236}">
+                <a16:creationId xmlns:a16="http://schemas.microsoft.com/office/drawing/2014/main" id="{1E8E9E5B-13E5-452C-8753-EDEF25F26E94}"/>
+              </a:ext>
+            </a:extLst>
+          </p:cNvPr>
+          <p:cNvSpPr>
+            <a:spLocks noGrp="1"/>
+          </p:cNvSpPr>
+          <p:nvPr>
+            <p:ph idx="1"/>
+          </p:nvPr>
+        </p:nvSpPr>
+        <p:spPr>
+          <a:xfrm>
+            <a:off x="527052" y="1196752"/>
+            <a:ext cx="11137899" cy="5111972"/>
+          </a:xfrm>
+        </p:spPr>
+        <p:txBody>
+          <a:bodyPr/>
+          <a:lstStyle/>
+          <a:p>
+            <a:r>
+              <a:rPr lang="zh-CN" altLang="en-US" dirty="0"/>
+              <a:t>一、信道带宽为 </a:t>
+            </a:r>
+            <a:r>
+              <a:rPr lang="en-US" altLang="zh-CN" dirty="0"/>
+              <a:t>2 </a:t>
+            </a:r>
+            <a:r>
+              <a:rPr lang="en-US" altLang="zh-CN" dirty="0" err="1"/>
+              <a:t>Mhz</a:t>
+            </a:r>
+            <a:r>
+              <a:rPr lang="zh-CN" altLang="en-US" dirty="0"/>
+              <a:t>，信噪比为 </a:t>
+            </a:r>
+            <a:r>
+              <a:rPr lang="en-US" altLang="zh-CN" dirty="0"/>
+              <a:t>30dB</a:t>
+            </a:r>
+            <a:r>
+              <a:rPr lang="zh-CN" altLang="en-US" dirty="0"/>
+              <a:t>，按照香农定理，该信道的极限数据率为（    ）</a:t>
+            </a:r>
+            <a:endParaRPr lang="en-US" altLang="zh-CN" dirty="0"/>
+          </a:p>
+          <a:p>
+            <a:pPr marL="0" indent="0">
+              <a:buNone/>
+            </a:pPr>
+            <a:r>
+              <a:rPr lang="en-US" altLang="zh-CN" dirty="0"/>
+              <a:t>A.</a:t>
+            </a:r>
+            <a:r>
+              <a:rPr lang="zh-CN" altLang="en-US" dirty="0"/>
+              <a:t> </a:t>
+            </a:r>
+            <a:r>
+              <a:rPr lang="en-US" altLang="zh-CN" dirty="0"/>
+              <a:t>20</a:t>
+            </a:r>
+            <a:r>
+              <a:rPr lang="zh-CN" altLang="en-US" dirty="0"/>
+              <a:t> </a:t>
+            </a:r>
+            <a:r>
+              <a:rPr lang="en-US" altLang="zh-CN" dirty="0"/>
+              <a:t>Mbps	B. 40 Mbps	C. 60 Mbps	D. 100 Mbps</a:t>
+            </a:r>
+          </a:p>
+          <a:p>
+            <a:pPr marL="0" indent="0">
+              <a:buNone/>
+            </a:pPr>
+            <a:endParaRPr lang="en-US" altLang="zh-CN" dirty="0"/>
+          </a:p>
+          <a:p>
+            <a:r>
+              <a:rPr lang="zh-CN" altLang="en-US" dirty="0"/>
+              <a:t>二、</a:t>
+            </a:r>
+            <a:r>
+              <a:rPr lang="en-US" altLang="zh-CN" dirty="0"/>
+              <a:t>( 7 </a:t>
+            </a:r>
+            <a:r>
+              <a:rPr lang="zh-CN" altLang="en-US" dirty="0"/>
+              <a:t>分 </a:t>
+            </a:r>
+            <a:r>
+              <a:rPr lang="en-US" altLang="zh-CN" dirty="0"/>
+              <a:t>)</a:t>
+            </a:r>
+            <a:r>
+              <a:rPr lang="zh-CN" altLang="en-US" dirty="0"/>
+              <a:t>假设接收方采用</a:t>
+            </a:r>
+            <a:r>
+              <a:rPr lang="en-US" altLang="zh-CN" dirty="0"/>
+              <a:t>CRC</a:t>
+            </a:r>
+            <a:r>
+              <a:rPr lang="zh-CN" altLang="en-US" dirty="0"/>
+              <a:t>生成多项式 </a:t>
+            </a:r>
+            <a:r>
+              <a:rPr lang="en-US" altLang="zh-CN" i="1" dirty="0">
+                <a:latin typeface="Times New Roman" panose="02020603050405020304" pitchFamily="18" charset="0"/>
+                <a:cs typeface="Times New Roman" panose="02020603050405020304" pitchFamily="18" charset="0"/>
+              </a:rPr>
+              <a:t>x</a:t>
+            </a:r>
+            <a:r>
+              <a:rPr lang="en-US" altLang="zh-CN" i="1" baseline="30000" dirty="0">
+                <a:latin typeface="Times New Roman" panose="02020603050405020304" pitchFamily="18" charset="0"/>
+                <a:cs typeface="Times New Roman" panose="02020603050405020304" pitchFamily="18" charset="0"/>
+              </a:rPr>
+              <a:t> </a:t>
+            </a:r>
+            <a:r>
+              <a:rPr lang="en-US" altLang="zh-CN" baseline="30000" dirty="0"/>
+              <a:t>4</a:t>
+            </a:r>
+            <a:r>
+              <a:rPr lang="en-US" altLang="zh-CN" dirty="0"/>
+              <a:t>+</a:t>
+            </a:r>
+            <a:r>
+              <a:rPr lang="en-US" altLang="zh-CN" i="1" dirty="0">
+                <a:latin typeface="Times New Roman" panose="02020603050405020304" pitchFamily="18" charset="0"/>
+                <a:cs typeface="Times New Roman" panose="02020603050405020304" pitchFamily="18" charset="0"/>
+              </a:rPr>
+              <a:t>x</a:t>
+            </a:r>
+            <a:r>
+              <a:rPr lang="en-US" altLang="zh-CN" dirty="0"/>
+              <a:t>+1</a:t>
+            </a:r>
+            <a:r>
+              <a:rPr lang="zh-CN" altLang="en-US" dirty="0"/>
+              <a:t>接收到的比特流为</a:t>
+            </a:r>
+            <a:r>
+              <a:rPr lang="en-US" altLang="zh-CN" dirty="0"/>
+              <a:t>110110101100</a:t>
+            </a:r>
+            <a:r>
+              <a:rPr lang="zh-CN" altLang="en-US" dirty="0"/>
+              <a:t>，问接收正确与否？计算给出原因。</a:t>
+            </a:r>
+            <a:endParaRPr lang="en-US" altLang="zh-CN" dirty="0"/>
+          </a:p>
+          <a:p>
+            <a:pPr marL="0" indent="0">
+              <a:buNone/>
+            </a:pPr>
+            <a:endParaRPr lang="zh-CN" altLang="en-US" dirty="0"/>
+          </a:p>
+        </p:txBody>
+      </p:sp>
+      <p:sp>
+        <p:nvSpPr>
+          <p:cNvPr id="8" name="标题 7">
+            <a:extLst>
+              <a:ext uri="{FF2B5EF4-FFF2-40B4-BE49-F238E27FC236}">
+                <a16:creationId xmlns:a16="http://schemas.microsoft.com/office/drawing/2014/main" id="{89237FF0-B11B-48BF-A3B6-29AB96C6DC24}"/>
+              </a:ext>
+            </a:extLst>
+          </p:cNvPr>
+          <p:cNvSpPr>
+            <a:spLocks noGrp="1"/>
+          </p:cNvSpPr>
+          <p:nvPr>
+            <p:ph type="title"/>
+          </p:nvPr>
+        </p:nvSpPr>
+        <p:spPr/>
+        <p:txBody>
+          <a:bodyPr/>
+          <a:lstStyle/>
+          <a:p>
+            <a:endParaRPr lang="zh-CN" altLang="en-US"/>
+          </a:p>
+        </p:txBody>
+      </p:sp>
+    </p:spTree>
+    <p:extLst>
+      <p:ext uri="{BB962C8B-B14F-4D97-AF65-F5344CB8AC3E}">
+        <p14:creationId xmlns:p14="http://schemas.microsoft.com/office/powerpoint/2010/main" val="3521824333"/>
+      </p:ext>
+    </p:extLst>
+  </p:cSld>
+  <p:clrMapOvr>
+    <a:masterClrMapping/>
+  </p:clrMapOvr>
+</p:sld>
+</file>
+
+<file path=ppt/slides/slide2.xml><?xml version="1.0" encoding="utf-8"?>
+<p:sld xmlns:a="http://schemas.openxmlformats.org/drawingml/2006/main" xmlns:r="http://schemas.openxmlformats.org/officeDocument/2006/relationships" xmlns:p="http://schemas.openxmlformats.org/presentationml/2006/main">
+  <p:cSld>
+    <p:spTree>
+      <p:nvGrpSpPr>
+        <p:cNvPr id="1" name=""/>
+        <p:cNvGrpSpPr/>
+        <p:nvPr/>
+      </p:nvGrpSpPr>
+      <p:grpSpPr>
+        <a:xfrm>
+          <a:off x="0" y="0"/>
+          <a:ext cx="0" cy="0"/>
+          <a:chOff x="0" y="0"/>
+          <a:chExt cx="0" cy="0"/>
+        </a:xfrm>
+      </p:grpSpPr>
+      <p:sp>
+        <p:nvSpPr>
           <p:cNvPr id="2" name="标题 1">
             <a:extLst>
               <a:ext uri="{FF2B5EF4-FFF2-40B4-BE49-F238E27FC236}">
@@ -9200,7 +9424,7 @@
     </p:spTree>
     <p:extLst>
       <p:ext uri="{BB962C8B-B14F-4D97-AF65-F5344CB8AC3E}">
-        <p14:creationId xmlns:p14="http://schemas.microsoft.com/office/powerpoint/2010/main" val="3521824333"/>
+        <p14:creationId xmlns:p14="http://schemas.microsoft.com/office/powerpoint/2010/main" val="3581736668"/>
       </p:ext>
     </p:extLst>
   </p:cSld>
@@ -9578,7 +9802,7 @@
 </p:sld>
 </file>
 
-<file path=ppt/slides/slide2.xml><?xml version="1.0" encoding="utf-8"?>
+<file path=ppt/slides/slide3.xml><?xml version="1.0" encoding="utf-8"?>
 <p:sld xmlns:a="http://schemas.openxmlformats.org/drawingml/2006/main" xmlns:r="http://schemas.openxmlformats.org/officeDocument/2006/relationships" xmlns:p="http://schemas.openxmlformats.org/presentationml/2006/main">
   <p:cSld>
     <p:spTree>
@@ -10738,7 +10962,7 @@
 </p:sld>
 </file>
 
-<file path=ppt/slides/slide3.xml><?xml version="1.0" encoding="utf-8"?>
+<file path=ppt/slides/slide4.xml><?xml version="1.0" encoding="utf-8"?>
 <p:sld xmlns:a="http://schemas.openxmlformats.org/drawingml/2006/main" xmlns:r="http://schemas.openxmlformats.org/officeDocument/2006/relationships" xmlns:p="http://schemas.openxmlformats.org/presentationml/2006/main">
   <p:cSld>
     <p:spTree>
@@ -11159,7 +11383,7 @@
 </p:sld>
 </file>
 
-<file path=ppt/slides/slide4.xml><?xml version="1.0" encoding="utf-8"?>
+<file path=ppt/slides/slide5.xml><?xml version="1.0" encoding="utf-8"?>
 <p:sld xmlns:a="http://schemas.openxmlformats.org/drawingml/2006/main" xmlns:r="http://schemas.openxmlformats.org/officeDocument/2006/relationships" xmlns:p="http://schemas.openxmlformats.org/presentationml/2006/main">
   <p:cSld>
     <p:spTree>

</xml_diff>